<commit_message>
ecape analysis, misc cleanup
</commit_message>
<xml_diff>
--- a/pres/InternalsNotes.pptx
+++ b/pres/InternalsNotes.pptx
@@ -5,7 +5,7 @@
     <p:sldMasterId id="2147483648" r:id="rId1"/>
   </p:sldMasterIdLst>
   <p:notesMasterIdLst>
-    <p:notesMasterId r:id="rId19"/>
+    <p:notesMasterId r:id="rId20"/>
   </p:notesMasterIdLst>
   <p:sldIdLst>
     <p:sldId id="256" r:id="rId2"/>
@@ -18,13 +18,14 @@
     <p:sldId id="263" r:id="rId9"/>
     <p:sldId id="264" r:id="rId10"/>
     <p:sldId id="265" r:id="rId11"/>
-    <p:sldId id="266" r:id="rId12"/>
-    <p:sldId id="267" r:id="rId13"/>
-    <p:sldId id="268" r:id="rId14"/>
-    <p:sldId id="269" r:id="rId15"/>
-    <p:sldId id="270" r:id="rId16"/>
-    <p:sldId id="271" r:id="rId17"/>
-    <p:sldId id="272" r:id="rId18"/>
+    <p:sldId id="273" r:id="rId12"/>
+    <p:sldId id="266" r:id="rId13"/>
+    <p:sldId id="267" r:id="rId14"/>
+    <p:sldId id="268" r:id="rId15"/>
+    <p:sldId id="269" r:id="rId16"/>
+    <p:sldId id="270" r:id="rId17"/>
+    <p:sldId id="271" r:id="rId18"/>
+    <p:sldId id="272" r:id="rId19"/>
   </p:sldIdLst>
   <p:sldSz cx="12192000" cy="6858000"/>
   <p:notesSz cx="6858000" cy="9144000"/>
@@ -123,6 +124,11 @@
       </a:defRPr>
     </a:lvl9pPr>
   </p:defaultTextStyle>
+  <p:extLst>
+    <p:ext uri="{EFAFB233-063F-42B5-8137-9DF3F51BA10A}">
+      <p15:sldGuideLst xmlns:p15="http://schemas.microsoft.com/office/powerpoint/2012/main"/>
+    </p:ext>
+  </p:extLst>
 </p:presentation>
 </file>
 
@@ -208,7 +214,7 @@
           <a:p>
             <a:fld id="{6781CEBC-FE23-5145-BAB2-25725FB213CB}" type="datetimeFigureOut">
               <a:rPr lang="en-US" smtClean="0"/>
-              <a:t>9/8/16</a:t>
+              <a:t>9/15/16</a:t>
             </a:fld>
             <a:endParaRPr lang="en-US"/>
           </a:p>
@@ -1218,7 +1224,7 @@
           <a:p>
             <a:fld id="{2E8B020D-A5FD-674D-8E7E-DEE0BA526BBC}" type="slidenum">
               <a:rPr lang="en-US" smtClean="0"/>
-              <a:t>14</a:t>
+              <a:t>15</a:t>
             </a:fld>
             <a:endParaRPr lang="en-US"/>
           </a:p>
@@ -1594,14 +1600,6 @@
               </a:rPr>
               <a:t> 200000</a:t>
             </a:r>
-            <a:endParaRPr lang="it-IT" sz="1200" kern="1200" dirty="0" smtClean="0">
-              <a:solidFill>
-                <a:schemeClr val="tx1"/>
-              </a:solidFill>
-              <a:latin typeface="+mn-lt"/>
-              <a:ea typeface="+mn-ea"/>
-              <a:cs typeface="+mn-cs"/>
-            </a:endParaRPr>
           </a:p>
           <a:p>
             <a:pPr marL="0" marR="0" indent="0" algn="l" defTabSz="914400" rtl="0" eaLnBrk="1" fontAlgn="auto" latinLnBrk="0" hangingPunct="1">
@@ -1820,7 +1818,7 @@
           <a:p>
             <a:fld id="{2E8B020D-A5FD-674D-8E7E-DEE0BA526BBC}" type="slidenum">
               <a:rPr lang="en-US" smtClean="0"/>
-              <a:t>16</a:t>
+              <a:t>17</a:t>
             </a:fld>
             <a:endParaRPr lang="en-US"/>
           </a:p>
@@ -1970,7 +1968,7 @@
           <a:p>
             <a:fld id="{330BA9AC-EBBD-B243-B8F2-14EB821B7DD3}" type="datetimeFigureOut">
               <a:rPr lang="en-US" smtClean="0"/>
-              <a:t>9/8/16</a:t>
+              <a:t>9/15/16</a:t>
             </a:fld>
             <a:endParaRPr lang="en-US"/>
           </a:p>
@@ -2140,7 +2138,7 @@
           <a:p>
             <a:fld id="{330BA9AC-EBBD-B243-B8F2-14EB821B7DD3}" type="datetimeFigureOut">
               <a:rPr lang="en-US" smtClean="0"/>
-              <a:t>9/8/16</a:t>
+              <a:t>9/15/16</a:t>
             </a:fld>
             <a:endParaRPr lang="en-US"/>
           </a:p>
@@ -2320,7 +2318,7 @@
           <a:p>
             <a:fld id="{330BA9AC-EBBD-B243-B8F2-14EB821B7DD3}" type="datetimeFigureOut">
               <a:rPr lang="en-US" smtClean="0"/>
-              <a:t>9/8/16</a:t>
+              <a:t>9/15/16</a:t>
             </a:fld>
             <a:endParaRPr lang="en-US"/>
           </a:p>
@@ -2490,7 +2488,7 @@
           <a:p>
             <a:fld id="{330BA9AC-EBBD-B243-B8F2-14EB821B7DD3}" type="datetimeFigureOut">
               <a:rPr lang="en-US" smtClean="0"/>
-              <a:t>9/8/16</a:t>
+              <a:t>9/15/16</a:t>
             </a:fld>
             <a:endParaRPr lang="en-US"/>
           </a:p>
@@ -2736,7 +2734,7 @@
           <a:p>
             <a:fld id="{330BA9AC-EBBD-B243-B8F2-14EB821B7DD3}" type="datetimeFigureOut">
               <a:rPr lang="en-US" smtClean="0"/>
-              <a:t>9/8/16</a:t>
+              <a:t>9/15/16</a:t>
             </a:fld>
             <a:endParaRPr lang="en-US"/>
           </a:p>
@@ -2968,7 +2966,7 @@
           <a:p>
             <a:fld id="{330BA9AC-EBBD-B243-B8F2-14EB821B7DD3}" type="datetimeFigureOut">
               <a:rPr lang="en-US" smtClean="0"/>
-              <a:t>9/8/16</a:t>
+              <a:t>9/15/16</a:t>
             </a:fld>
             <a:endParaRPr lang="en-US"/>
           </a:p>
@@ -3335,7 +3333,7 @@
           <a:p>
             <a:fld id="{330BA9AC-EBBD-B243-B8F2-14EB821B7DD3}" type="datetimeFigureOut">
               <a:rPr lang="en-US" smtClean="0"/>
-              <a:t>9/8/16</a:t>
+              <a:t>9/15/16</a:t>
             </a:fld>
             <a:endParaRPr lang="en-US"/>
           </a:p>
@@ -3453,7 +3451,7 @@
           <a:p>
             <a:fld id="{330BA9AC-EBBD-B243-B8F2-14EB821B7DD3}" type="datetimeFigureOut">
               <a:rPr lang="en-US" smtClean="0"/>
-              <a:t>9/8/16</a:t>
+              <a:t>9/15/16</a:t>
             </a:fld>
             <a:endParaRPr lang="en-US"/>
           </a:p>
@@ -3548,7 +3546,7 @@
           <a:p>
             <a:fld id="{330BA9AC-EBBD-B243-B8F2-14EB821B7DD3}" type="datetimeFigureOut">
               <a:rPr lang="en-US" smtClean="0"/>
-              <a:t>9/8/16</a:t>
+              <a:t>9/15/16</a:t>
             </a:fld>
             <a:endParaRPr lang="en-US"/>
           </a:p>
@@ -3825,7 +3823,7 @@
           <a:p>
             <a:fld id="{330BA9AC-EBBD-B243-B8F2-14EB821B7DD3}" type="datetimeFigureOut">
               <a:rPr lang="en-US" smtClean="0"/>
-              <a:t>9/8/16</a:t>
+              <a:t>9/15/16</a:t>
             </a:fld>
             <a:endParaRPr lang="en-US"/>
           </a:p>
@@ -4078,7 +4076,7 @@
           <a:p>
             <a:fld id="{330BA9AC-EBBD-B243-B8F2-14EB821B7DD3}" type="datetimeFigureOut">
               <a:rPr lang="en-US" smtClean="0"/>
-              <a:t>9/8/16</a:t>
+              <a:t>9/15/16</a:t>
             </a:fld>
             <a:endParaRPr lang="en-US"/>
           </a:p>
@@ -4291,7 +4289,7 @@
           <a:p>
             <a:fld id="{330BA9AC-EBBD-B243-B8F2-14EB821B7DD3}" type="datetimeFigureOut">
               <a:rPr lang="en-US" smtClean="0"/>
-              <a:t>9/8/16</a:t>
+              <a:t>9/15/16</a:t>
             </a:fld>
             <a:endParaRPr lang="en-US"/>
           </a:p>
@@ -4875,7 +4873,7 @@
           <a:p>
             <a:r>
               <a:rPr lang="en-US" dirty="0" smtClean="0"/>
-              <a:t>JIT miscellany	</a:t>
+              <a:t>JIT Example: Escape Analysis</a:t>
             </a:r>
             <a:endParaRPr lang="en-US" dirty="0"/>
           </a:p>
@@ -4898,54 +4896,11 @@
           <a:p>
             <a:r>
               <a:rPr lang="en-US" dirty="0" err="1" smtClean="0"/>
-              <a:t>Scalarization</a:t>
+              <a:t>EscapeExample.java</a:t>
             </a:r>
             <a:endParaRPr lang="en-US" dirty="0" smtClean="0"/>
           </a:p>
           <a:p>
-            <a:pPr lvl="1"/>
-            <a:r>
-              <a:rPr lang="en-US" dirty="0" smtClean="0"/>
-              <a:t>Must prove non-</a:t>
-            </a:r>
-            <a:r>
-              <a:rPr lang="en-US" dirty="0" err="1" smtClean="0"/>
-              <a:t>nullablity</a:t>
-            </a:r>
-            <a:r>
-              <a:rPr lang="en-US" dirty="0" smtClean="0"/>
-              <a:t>!</a:t>
-            </a:r>
-          </a:p>
-          <a:p>
-            <a:r>
-              <a:rPr lang="en-US" dirty="0" smtClean="0"/>
-              <a:t>Lock </a:t>
-            </a:r>
-            <a:r>
-              <a:rPr lang="en-US" dirty="0" err="1" smtClean="0"/>
-              <a:t>Ellision</a:t>
-            </a:r>
-            <a:endParaRPr lang="en-US" dirty="0" smtClean="0"/>
-          </a:p>
-          <a:p>
-            <a:r>
-              <a:rPr lang="en-US" dirty="0" smtClean="0"/>
-              <a:t>Constant folding</a:t>
-            </a:r>
-          </a:p>
-          <a:p>
-            <a:pPr lvl="1"/>
-            <a:r>
-              <a:rPr lang="en-US" dirty="0" smtClean="0"/>
-              <a:t>Any static final field, not just compile-time constants!</a:t>
-            </a:r>
-          </a:p>
-          <a:p>
-            <a:r>
-              <a:rPr lang="en-US" dirty="0" smtClean="0"/>
-              <a:t>Favor Small Methods on the Fast Path</a:t>
-            </a:r>
             <a:endParaRPr lang="en-US" dirty="0"/>
           </a:p>
         </p:txBody>
@@ -4953,7 +4908,7 @@
     </p:spTree>
     <p:extLst>
       <p:ext uri="{BB962C8B-B14F-4D97-AF65-F5344CB8AC3E}">
-        <p14:creationId xmlns:p14="http://schemas.microsoft.com/office/powerpoint/2010/main" val="1022524355"/>
+        <p14:creationId xmlns:p14="http://schemas.microsoft.com/office/powerpoint/2010/main" val="263006984"/>
       </p:ext>
     </p:extLst>
   </p:cSld>
@@ -4997,6 +4952,128 @@
           <a:p>
             <a:r>
               <a:rPr lang="en-US" dirty="0" smtClean="0"/>
+              <a:t>JIT miscellany	</a:t>
+            </a:r>
+            <a:endParaRPr lang="en-US" dirty="0"/>
+          </a:p>
+        </p:txBody>
+      </p:sp>
+      <p:sp>
+        <p:nvSpPr>
+          <p:cNvPr id="3" name="Content Placeholder 2"/>
+          <p:cNvSpPr>
+            <a:spLocks noGrp="1"/>
+          </p:cNvSpPr>
+          <p:nvPr>
+            <p:ph idx="1"/>
+          </p:nvPr>
+        </p:nvSpPr>
+        <p:spPr/>
+        <p:txBody>
+          <a:bodyPr/>
+          <a:lstStyle/>
+          <a:p>
+            <a:r>
+              <a:rPr lang="en-US" dirty="0" err="1" smtClean="0"/>
+              <a:t>Scalarization</a:t>
+            </a:r>
+            <a:endParaRPr lang="en-US" dirty="0" smtClean="0"/>
+          </a:p>
+          <a:p>
+            <a:pPr lvl="1"/>
+            <a:r>
+              <a:rPr lang="en-US" dirty="0" smtClean="0"/>
+              <a:t>Must prove non-</a:t>
+            </a:r>
+            <a:r>
+              <a:rPr lang="en-US" dirty="0" err="1" smtClean="0"/>
+              <a:t>nullablity</a:t>
+            </a:r>
+            <a:r>
+              <a:rPr lang="en-US" dirty="0" smtClean="0"/>
+              <a:t>!</a:t>
+            </a:r>
+          </a:p>
+          <a:p>
+            <a:r>
+              <a:rPr lang="en-US" dirty="0" smtClean="0"/>
+              <a:t>Lock </a:t>
+            </a:r>
+            <a:r>
+              <a:rPr lang="en-US" dirty="0" err="1" smtClean="0"/>
+              <a:t>Ellision</a:t>
+            </a:r>
+            <a:endParaRPr lang="en-US" dirty="0" smtClean="0"/>
+          </a:p>
+          <a:p>
+            <a:r>
+              <a:rPr lang="en-US" dirty="0" smtClean="0"/>
+              <a:t>Constant folding</a:t>
+            </a:r>
+          </a:p>
+          <a:p>
+            <a:pPr lvl="1"/>
+            <a:r>
+              <a:rPr lang="en-US" dirty="0" smtClean="0"/>
+              <a:t>Any static final field, not just compile-time constants!</a:t>
+            </a:r>
+          </a:p>
+          <a:p>
+            <a:r>
+              <a:rPr lang="en-US" dirty="0" smtClean="0"/>
+              <a:t>Favor Small Methods on the Fast Path</a:t>
+            </a:r>
+            <a:endParaRPr lang="en-US" dirty="0"/>
+          </a:p>
+        </p:txBody>
+      </p:sp>
+    </p:spTree>
+    <p:extLst>
+      <p:ext uri="{BB962C8B-B14F-4D97-AF65-F5344CB8AC3E}">
+        <p14:creationId xmlns:p14="http://schemas.microsoft.com/office/powerpoint/2010/main" val="1022524355"/>
+      </p:ext>
+    </p:extLst>
+  </p:cSld>
+  <p:clrMapOvr>
+    <a:masterClrMapping/>
+  </p:clrMapOvr>
+</p:sld>
+</file>
+
+<file path=ppt/slides/slide13.xml><?xml version="1.0" encoding="utf-8"?>
+<p:sld xmlns:a="http://schemas.openxmlformats.org/drawingml/2006/main" xmlns:r="http://schemas.openxmlformats.org/officeDocument/2006/relationships" xmlns:p="http://schemas.openxmlformats.org/presentationml/2006/main">
+  <p:cSld>
+    <p:spTree>
+      <p:nvGrpSpPr>
+        <p:cNvPr id="1" name=""/>
+        <p:cNvGrpSpPr/>
+        <p:nvPr/>
+      </p:nvGrpSpPr>
+      <p:grpSpPr>
+        <a:xfrm>
+          <a:off x="0" y="0"/>
+          <a:ext cx="0" cy="0"/>
+          <a:chOff x="0" y="0"/>
+          <a:chExt cx="0" cy="0"/>
+        </a:xfrm>
+      </p:grpSpPr>
+      <p:sp>
+        <p:nvSpPr>
+          <p:cNvPr id="2" name="Title 1"/>
+          <p:cNvSpPr>
+            <a:spLocks noGrp="1"/>
+          </p:cNvSpPr>
+          <p:nvPr>
+            <p:ph type="title"/>
+          </p:nvPr>
+        </p:nvSpPr>
+        <p:spPr/>
+        <p:txBody>
+          <a:bodyPr/>
+          <a:lstStyle/>
+          <a:p>
+            <a:r>
+              <a:rPr lang="en-US" dirty="0" smtClean="0"/>
               <a:t>GC</a:t>
             </a:r>
             <a:endParaRPr lang="en-US" dirty="0"/>
@@ -5041,7 +5118,6 @@
               <a:rPr lang="en-US" dirty="0" smtClean="0"/>
               <a:t>Generational Hypothesis</a:t>
             </a:r>
-            <a:endParaRPr lang="en-US" dirty="0" smtClean="0"/>
           </a:p>
           <a:p>
             <a:r>
@@ -5064,7 +5140,7 @@
 </p:sld>
 </file>
 
-<file path=ppt/slides/slide13.xml><?xml version="1.0" encoding="utf-8"?>
+<file path=ppt/slides/slide14.xml><?xml version="1.0" encoding="utf-8"?>
 <p:sld xmlns:a="http://schemas.openxmlformats.org/drawingml/2006/main" xmlns:r="http://schemas.openxmlformats.org/officeDocument/2006/relationships" xmlns:p="http://schemas.openxmlformats.org/presentationml/2006/main">
   <p:cSld>
     <p:spTree>
@@ -5349,119 +5425,6 @@
 </p:sld>
 </file>
 
-<file path=ppt/slides/slide14.xml><?xml version="1.0" encoding="utf-8"?>
-<p:sld xmlns:a="http://schemas.openxmlformats.org/drawingml/2006/main" xmlns:r="http://schemas.openxmlformats.org/officeDocument/2006/relationships" xmlns:p="http://schemas.openxmlformats.org/presentationml/2006/main">
-  <p:cSld>
-    <p:spTree>
-      <p:nvGrpSpPr>
-        <p:cNvPr id="1" name=""/>
-        <p:cNvGrpSpPr/>
-        <p:nvPr/>
-      </p:nvGrpSpPr>
-      <p:grpSpPr>
-        <a:xfrm>
-          <a:off x="0" y="0"/>
-          <a:ext cx="0" cy="0"/>
-          <a:chOff x="0" y="0"/>
-          <a:chExt cx="0" cy="0"/>
-        </a:xfrm>
-      </p:grpSpPr>
-      <p:sp>
-        <p:nvSpPr>
-          <p:cNvPr id="2" name="Title 1"/>
-          <p:cNvSpPr>
-            <a:spLocks noGrp="1"/>
-          </p:cNvSpPr>
-          <p:nvPr>
-            <p:ph type="title"/>
-          </p:nvPr>
-        </p:nvSpPr>
-        <p:spPr/>
-        <p:txBody>
-          <a:bodyPr/>
-          <a:lstStyle/>
-          <a:p>
-            <a:r>
-              <a:rPr lang="en-US" dirty="0" smtClean="0"/>
-              <a:t>Concurrency</a:t>
-            </a:r>
-            <a:endParaRPr lang="en-US" dirty="0"/>
-          </a:p>
-        </p:txBody>
-      </p:sp>
-      <p:sp>
-        <p:nvSpPr>
-          <p:cNvPr id="3" name="Content Placeholder 2"/>
-          <p:cNvSpPr>
-            <a:spLocks noGrp="1"/>
-          </p:cNvSpPr>
-          <p:nvPr>
-            <p:ph idx="1"/>
-          </p:nvPr>
-        </p:nvSpPr>
-        <p:spPr/>
-        <p:txBody>
-          <a:bodyPr/>
-          <a:lstStyle/>
-          <a:p>
-            <a:r>
-              <a:rPr lang="en-US" dirty="0" smtClean="0"/>
-              <a:t>How does marking work while data changes?</a:t>
-            </a:r>
-          </a:p>
-          <a:p>
-            <a:pPr lvl="1"/>
-            <a:r>
-              <a:rPr lang="en-US" dirty="0" smtClean="0"/>
-              <a:t>In-flight changes</a:t>
-            </a:r>
-          </a:p>
-          <a:p>
-            <a:pPr lvl="1"/>
-            <a:r>
-              <a:rPr lang="en-US" dirty="0" smtClean="0"/>
-              <a:t>Young Collections</a:t>
-            </a:r>
-          </a:p>
-          <a:p>
-            <a:pPr lvl="1"/>
-            <a:r>
-              <a:rPr lang="en-US" dirty="0" smtClean="0"/>
-              <a:t>CMS</a:t>
-            </a:r>
-          </a:p>
-          <a:p>
-            <a:pPr lvl="1"/>
-            <a:endParaRPr lang="en-US" dirty="0" smtClean="0"/>
-          </a:p>
-          <a:p>
-            <a:r>
-              <a:rPr lang="en-US" dirty="0" err="1" smtClean="0"/>
-              <a:t>Safepoints</a:t>
-            </a:r>
-            <a:endParaRPr lang="en-US" dirty="0"/>
-          </a:p>
-          <a:p>
-            <a:r>
-              <a:rPr lang="en-US" dirty="0" smtClean="0"/>
-              <a:t>Card Marking</a:t>
-            </a:r>
-          </a:p>
-        </p:txBody>
-      </p:sp>
-    </p:spTree>
-    <p:extLst>
-      <p:ext uri="{BB962C8B-B14F-4D97-AF65-F5344CB8AC3E}">
-        <p14:creationId xmlns:p14="http://schemas.microsoft.com/office/powerpoint/2010/main" val="1530770028"/>
-      </p:ext>
-    </p:extLst>
-  </p:cSld>
-  <p:clrMapOvr>
-    <a:masterClrMapping/>
-  </p:clrMapOvr>
-</p:sld>
-</file>
-
 <file path=ppt/slides/slide15.xml><?xml version="1.0" encoding="utf-8"?>
 <p:sld xmlns:a="http://schemas.openxmlformats.org/drawingml/2006/main" xmlns:r="http://schemas.openxmlformats.org/officeDocument/2006/relationships" xmlns:p="http://schemas.openxmlformats.org/presentationml/2006/main">
   <p:cSld>
@@ -5496,7 +5459,7 @@
           <a:p>
             <a:r>
               <a:rPr lang="en-US" dirty="0" smtClean="0"/>
-              <a:t>GC Performance</a:t>
+              <a:t>Concurrency</a:t>
             </a:r>
             <a:endParaRPr lang="en-US" dirty="0"/>
           </a:p>
@@ -5519,26 +5482,62 @@
           <a:p>
             <a:r>
               <a:rPr lang="en-US" dirty="0" smtClean="0"/>
-              <a:t>Generational Mandate</a:t>
-            </a:r>
+              <a:t>How </a:t>
+            </a:r>
+            <a:r>
+              <a:rPr lang="en-US" dirty="0" smtClean="0"/>
+              <a:t>to mark while code is running?</a:t>
+            </a:r>
+            <a:endParaRPr lang="en-US" dirty="0" smtClean="0"/>
           </a:p>
           <a:p>
             <a:pPr lvl="1"/>
             <a:r>
               <a:rPr lang="en-US" dirty="0" smtClean="0"/>
-              <a:t>Objects should die young or live forever</a:t>
+              <a:t>In-flight changes</a:t>
             </a:r>
           </a:p>
           <a:p>
             <a:pPr lvl="1"/>
+            <a:r>
+              <a:rPr lang="en-US" dirty="0" smtClean="0"/>
+              <a:t>Partial (Young) </a:t>
+            </a:r>
+            <a:r>
+              <a:rPr lang="en-US" dirty="0" smtClean="0"/>
+              <a:t>Collections</a:t>
+            </a:r>
+          </a:p>
+          <a:p>
+            <a:pPr lvl="1"/>
+            <a:r>
+              <a:rPr lang="en-US" dirty="0" smtClean="0"/>
+              <a:t>CMS</a:t>
+            </a:r>
+          </a:p>
+          <a:p>
+            <a:pPr lvl="1"/>
+            <a:endParaRPr lang="en-US" dirty="0" smtClean="0"/>
+          </a:p>
+          <a:p>
+            <a:r>
+              <a:rPr lang="en-US" dirty="0" err="1" smtClean="0"/>
+              <a:t>Safepoints</a:t>
+            </a:r>
             <a:endParaRPr lang="en-US" dirty="0"/>
+          </a:p>
+          <a:p>
+            <a:r>
+              <a:rPr lang="en-US" dirty="0" smtClean="0"/>
+              <a:t>Card Marking</a:t>
+            </a:r>
           </a:p>
         </p:txBody>
       </p:sp>
     </p:spTree>
     <p:extLst>
       <p:ext uri="{BB962C8B-B14F-4D97-AF65-F5344CB8AC3E}">
-        <p14:creationId xmlns:p14="http://schemas.microsoft.com/office/powerpoint/2010/main" val="1948708128"/>
+        <p14:creationId xmlns:p14="http://schemas.microsoft.com/office/powerpoint/2010/main" val="1530770028"/>
       </p:ext>
     </p:extLst>
   </p:cSld>
@@ -5582,6 +5581,92 @@
           <a:p>
             <a:r>
               <a:rPr lang="en-US" dirty="0" smtClean="0"/>
+              <a:t>GC Performance</a:t>
+            </a:r>
+            <a:endParaRPr lang="en-US" dirty="0"/>
+          </a:p>
+        </p:txBody>
+      </p:sp>
+      <p:sp>
+        <p:nvSpPr>
+          <p:cNvPr id="3" name="Content Placeholder 2"/>
+          <p:cNvSpPr>
+            <a:spLocks noGrp="1"/>
+          </p:cNvSpPr>
+          <p:nvPr>
+            <p:ph idx="1"/>
+          </p:nvPr>
+        </p:nvSpPr>
+        <p:spPr/>
+        <p:txBody>
+          <a:bodyPr/>
+          <a:lstStyle/>
+          <a:p>
+            <a:r>
+              <a:rPr lang="en-US" dirty="0" smtClean="0"/>
+              <a:t>Generational Mandate</a:t>
+            </a:r>
+          </a:p>
+          <a:p>
+            <a:pPr lvl="1"/>
+            <a:r>
+              <a:rPr lang="en-US" dirty="0" smtClean="0"/>
+              <a:t>Objects should die young or live forever</a:t>
+            </a:r>
+          </a:p>
+          <a:p>
+            <a:pPr lvl="1"/>
+            <a:endParaRPr lang="en-US" dirty="0"/>
+          </a:p>
+        </p:txBody>
+      </p:sp>
+    </p:spTree>
+    <p:extLst>
+      <p:ext uri="{BB962C8B-B14F-4D97-AF65-F5344CB8AC3E}">
+        <p14:creationId xmlns:p14="http://schemas.microsoft.com/office/powerpoint/2010/main" val="1948708128"/>
+      </p:ext>
+    </p:extLst>
+  </p:cSld>
+  <p:clrMapOvr>
+    <a:masterClrMapping/>
+  </p:clrMapOvr>
+</p:sld>
+</file>
+
+<file path=ppt/slides/slide17.xml><?xml version="1.0" encoding="utf-8"?>
+<p:sld xmlns:a="http://schemas.openxmlformats.org/drawingml/2006/main" xmlns:r="http://schemas.openxmlformats.org/officeDocument/2006/relationships" xmlns:p="http://schemas.openxmlformats.org/presentationml/2006/main">
+  <p:cSld>
+    <p:spTree>
+      <p:nvGrpSpPr>
+        <p:cNvPr id="1" name=""/>
+        <p:cNvGrpSpPr/>
+        <p:nvPr/>
+      </p:nvGrpSpPr>
+      <p:grpSpPr>
+        <a:xfrm>
+          <a:off x="0" y="0"/>
+          <a:ext cx="0" cy="0"/>
+          <a:chOff x="0" y="0"/>
+          <a:chExt cx="0" cy="0"/>
+        </a:xfrm>
+      </p:grpSpPr>
+      <p:sp>
+        <p:nvSpPr>
+          <p:cNvPr id="2" name="Title 1"/>
+          <p:cNvSpPr>
+            <a:spLocks noGrp="1"/>
+          </p:cNvSpPr>
+          <p:nvPr>
+            <p:ph type="title"/>
+          </p:nvPr>
+        </p:nvSpPr>
+        <p:spPr/>
+        <p:txBody>
+          <a:bodyPr/>
+          <a:lstStyle/>
+          <a:p>
+            <a:r>
+              <a:rPr lang="en-US" dirty="0" smtClean="0"/>
               <a:t>GC Performance Example</a:t>
             </a:r>
             <a:endParaRPr lang="en-US" dirty="0"/>
@@ -5663,7 +5748,7 @@
 </p:sld>
 </file>
 
-<file path=ppt/slides/slide17.xml><?xml version="1.0" encoding="utf-8"?>
+<file path=ppt/slides/slide18.xml><?xml version="1.0" encoding="utf-8"?>
 <p:sld xmlns:a="http://schemas.openxmlformats.org/drawingml/2006/main" xmlns:r="http://schemas.openxmlformats.org/officeDocument/2006/relationships" xmlns:p="http://schemas.openxmlformats.org/presentationml/2006/main">
   <p:cSld>
     <p:spTree>

</xml_diff>